<commit_message>
updated iraq energy plot w/ corrected legend
</commit_message>
<xml_diff>
--- a/outputs/energy_and_softs.pptx
+++ b/outputs/energy_and_softs.pptx
@@ -107,6 +107,59 @@
     </a:lvl9pPr>
   </p:defaultTextStyle>
 </p:presentation>
+</file>
+
+<file path=ppt/revisionInfo.xml><?xml version="1.0" encoding="utf-8"?>
+<p1510:revInfo xmlns:a="http://schemas.openxmlformats.org/drawingml/2006/main" xmlns:r="http://schemas.openxmlformats.org/officeDocument/2006/relationships" xmlns:p1510="http://schemas.microsoft.com/office/powerpoint/2015/10/main">
+  <p1510:revLst>
+    <p1510:client id="{24FA8061-810C-0A49-B1A2-92272DBB4FE4}" v="1" dt="2023-02-08T22:33:21.086"/>
+  </p1510:revLst>
+</p1510:revInfo>
+</file>
+
+<file path=ppt/changesInfos/changesInfo1.xml><?xml version="1.0" encoding="utf-8"?>
+<pc:chgInfo xmlns:a="http://schemas.openxmlformats.org/drawingml/2006/main" xmlns:r="http://schemas.openxmlformats.org/officeDocument/2006/relationships" xmlns:ac="http://schemas.microsoft.com/office/drawing/2013/main/command" xmlns:pc="http://schemas.microsoft.com/office/powerpoint/2013/main/command">
+  <pc:docChgLst>
+    <pc:chgData name="Rebecca Cantu Davidson" userId="71c25ae9df02aa0f" providerId="LiveId" clId="{24FA8061-810C-0A49-B1A2-92272DBB4FE4}"/>
+    <pc:docChg chg="custSel modSld">
+      <pc:chgData name="Rebecca Cantu Davidson" userId="71c25ae9df02aa0f" providerId="LiveId" clId="{24FA8061-810C-0A49-B1A2-92272DBB4FE4}" dt="2023-02-08T22:33:39.853" v="7" actId="14100"/>
+      <pc:docMkLst>
+        <pc:docMk/>
+      </pc:docMkLst>
+      <pc:sldChg chg="addSp delSp modSp mod">
+        <pc:chgData name="Rebecca Cantu Davidson" userId="71c25ae9df02aa0f" providerId="LiveId" clId="{24FA8061-810C-0A49-B1A2-92272DBB4FE4}" dt="2023-02-08T22:33:39.853" v="7" actId="14100"/>
+        <pc:sldMkLst>
+          <pc:docMk/>
+          <pc:sldMk cId="3780080768" sldId="258"/>
+        </pc:sldMkLst>
+        <pc:spChg chg="add del mod">
+          <ac:chgData name="Rebecca Cantu Davidson" userId="71c25ae9df02aa0f" providerId="LiveId" clId="{24FA8061-810C-0A49-B1A2-92272DBB4FE4}" dt="2023-02-08T22:33:21.086" v="1" actId="931"/>
+          <ac:spMkLst>
+            <pc:docMk/>
+            <pc:sldMk cId="3780080768" sldId="258"/>
+            <ac:spMk id="6" creationId="{09C814EF-65D1-32B7-4554-686CC7C578B5}"/>
+          </ac:spMkLst>
+        </pc:spChg>
+        <pc:picChg chg="del">
+          <ac:chgData name="Rebecca Cantu Davidson" userId="71c25ae9df02aa0f" providerId="LiveId" clId="{24FA8061-810C-0A49-B1A2-92272DBB4FE4}" dt="2023-02-08T22:33:15.761" v="0" actId="478"/>
+          <ac:picMkLst>
+            <pc:docMk/>
+            <pc:sldMk cId="3780080768" sldId="258"/>
+            <ac:picMk id="3" creationId="{F79CC711-10B6-EB33-2115-3BE18D0C53E4}"/>
+          </ac:picMkLst>
+        </pc:picChg>
+        <pc:picChg chg="add mod">
+          <ac:chgData name="Rebecca Cantu Davidson" userId="71c25ae9df02aa0f" providerId="LiveId" clId="{24FA8061-810C-0A49-B1A2-92272DBB4FE4}" dt="2023-02-08T22:33:39.853" v="7" actId="14100"/>
+          <ac:picMkLst>
+            <pc:docMk/>
+            <pc:sldMk cId="3780080768" sldId="258"/>
+            <ac:picMk id="8" creationId="{BAF051F8-1208-112A-6531-D11990C76E9C}"/>
+          </ac:picMkLst>
+        </pc:picChg>
+      </pc:sldChg>
+    </pc:docChg>
+  </pc:docChgLst>
+</pc:chgInfo>
 </file>
 
 <file path=ppt/slideLayouts/slideLayout1.xml><?xml version="1.0" encoding="utf-8"?>
@@ -3785,10 +3838,10 @@
       </p:sp>
       <p:pic>
         <p:nvPicPr>
-          <p:cNvPr id="3" name="Content Placeholder 2" descr="Graphical user interface, chart, histogram&#10;&#10;Description automatically generated">
-            <a:extLst>
-              <a:ext uri="{FF2B5EF4-FFF2-40B4-BE49-F238E27FC236}">
-                <a16:creationId xmlns:a16="http://schemas.microsoft.com/office/drawing/2014/main" id="{F79CC711-10B6-EB33-2115-3BE18D0C53E4}"/>
+          <p:cNvPr id="8" name="Content Placeholder 7" descr="Graphical user interface, chart&#10;&#10;Description automatically generated">
+            <a:extLst>
+              <a:ext uri="{FF2B5EF4-FFF2-40B4-BE49-F238E27FC236}">
+                <a16:creationId xmlns:a16="http://schemas.microsoft.com/office/drawing/2014/main" id="{BAF051F8-1208-112A-6531-D11990C76E9C}"/>
               </a:ext>
             </a:extLst>
           </p:cNvPr>
@@ -3807,12 +3860,9 @@
         </p:blipFill>
         <p:spPr>
           <a:xfrm>
-            <a:off x="4626429" y="333974"/>
-            <a:ext cx="7435608" cy="5948487"/>
+            <a:off x="3986325" y="373714"/>
+            <a:ext cx="7724646" cy="6179718"/>
           </a:xfrm>
-          <a:prstGeom prst="rect">
-            <a:avLst/>
-          </a:prstGeom>
         </p:spPr>
       </p:pic>
     </p:spTree>

</xml_diff>